<commit_message>
new bayes opt png
</commit_message>
<xml_diff>
--- a/doc/poster/assets/densenet.pptx
+++ b/doc/poster/assets/densenet.pptx
@@ -3429,13 +3429,18 @@
           <a:lstStyle/>
           <a:p>
             <a:r>
-              <a:rPr kumimoji="1" lang="en-US" altLang="zh-CN" sz="2400" b="1" dirty="0" smtClean="0">
+              <a:rPr kumimoji="1" lang="en-US" altLang="zh-CN" sz="2400" b="1" dirty="0" err="1" smtClean="0">
                 <a:latin typeface="Arial" charset="0"/>
                 <a:ea typeface="Arial" charset="0"/>
                 <a:cs typeface="Arial" charset="0"/>
               </a:rPr>
-              <a:t>Hyper parameter</a:t>
-            </a:r>
+              <a:t>Hyperparameters</a:t>
+            </a:r>
+            <a:endParaRPr kumimoji="1" lang="en-US" altLang="zh-CN" sz="2400" b="1" dirty="0" smtClean="0">
+              <a:latin typeface="Arial" charset="0"/>
+              <a:ea typeface="Arial" charset="0"/>
+              <a:cs typeface="Arial" charset="0"/>
+            </a:endParaRPr>
           </a:p>
           <a:p>
             <a:endParaRPr kumimoji="1" lang="en-US" altLang="zh-CN" sz="2400" b="1" dirty="0" smtClean="0">
@@ -3471,11 +3476,6 @@
               </a:rPr>
               <a:t>Weight decay</a:t>
             </a:r>
-            <a:endParaRPr kumimoji="1" lang="en-US" altLang="zh-CN" sz="2400" b="1" dirty="0" smtClean="0">
-              <a:latin typeface="Arial" charset="0"/>
-              <a:ea typeface="Arial" charset="0"/>
-              <a:cs typeface="Arial" charset="0"/>
-            </a:endParaRPr>
           </a:p>
           <a:p>
             <a:pPr marL="342900" indent="-342900">

</xml_diff>

<commit_message>
update bayes opt png
</commit_message>
<xml_diff>
--- a/doc/poster/assets/densenet.pptx
+++ b/doc/poster/assets/densenet.pptx
@@ -3333,7 +3333,7 @@
             <p:ph idx="1"/>
           </p:nvPr>
         </p:nvPicPr>
-        <p:blipFill>
+        <p:blipFill rotWithShape="1">
           <a:blip r:embed="rId2">
             <a:extLst>
               <a:ext uri="{28A0092B-C50C-407E-A947-70E740481C1C}">
@@ -3341,14 +3341,13 @@
               </a:ext>
             </a:extLst>
           </a:blip>
-          <a:stretch>
-            <a:fillRect/>
-          </a:stretch>
+          <a:srcRect b="4370"/>
+          <a:stretch/>
         </p:blipFill>
         <p:spPr>
           <a:xfrm>
-            <a:off x="3534423" y="1532406"/>
-            <a:ext cx="5642467" cy="3457827"/>
+            <a:off x="3218963" y="1888781"/>
+            <a:ext cx="5642467" cy="3306723"/>
           </a:xfrm>
         </p:spPr>
       </p:pic>
@@ -3360,7 +3359,7 @@
         </p:nvSpPr>
         <p:spPr>
           <a:xfrm>
-            <a:off x="4233799" y="900772"/>
+            <a:off x="4220023" y="973530"/>
             <a:ext cx="3640347" cy="461665"/>
           </a:xfrm>
           <a:prstGeom prst="rect">
@@ -3375,7 +3374,7 @@
           <a:lstStyle/>
           <a:p>
             <a:r>
-              <a:rPr kumimoji="1" lang="en-US" altLang="zh-CN" sz="2400" b="1" dirty="0">
+              <a:rPr kumimoji="1" lang="en-US" altLang="zh-CN" sz="2400" dirty="0">
                 <a:latin typeface="Arial" charset="0"/>
                 <a:ea typeface="Arial" charset="0"/>
                 <a:cs typeface="Arial" charset="0"/>
@@ -3383,7 +3382,7 @@
               <a:t>Bayesian</a:t>
             </a:r>
             <a:r>
-              <a:rPr kumimoji="1" lang="zh-CN" altLang="en-US" sz="2400" b="1" dirty="0">
+              <a:rPr kumimoji="1" lang="zh-CN" altLang="en-US" sz="2400" dirty="0">
                 <a:latin typeface="Arial" charset="0"/>
                 <a:ea typeface="Arial" charset="0"/>
                 <a:cs typeface="Arial" charset="0"/>
@@ -3391,14 +3390,14 @@
               <a:t> </a:t>
             </a:r>
             <a:r>
-              <a:rPr kumimoji="1" lang="en-US" altLang="zh-CN" sz="2400" b="1" dirty="0" smtClean="0">
+              <a:rPr kumimoji="1" lang="en-US" altLang="zh-CN" sz="2400" dirty="0" smtClean="0">
                 <a:latin typeface="Arial" charset="0"/>
                 <a:ea typeface="Arial" charset="0"/>
                 <a:cs typeface="Arial" charset="0"/>
               </a:rPr>
               <a:t>Optimization</a:t>
             </a:r>
-            <a:endParaRPr kumimoji="1" lang="zh-CN" altLang="en-US" sz="2400" b="1" dirty="0">
+            <a:endParaRPr kumimoji="1" lang="zh-CN" altLang="en-US" sz="2400" dirty="0">
               <a:latin typeface="Arial" charset="0"/>
               <a:ea typeface="Arial" charset="0"/>
               <a:cs typeface="Arial" charset="0"/>
@@ -3414,8 +3413,8 @@
         </p:nvSpPr>
         <p:spPr>
           <a:xfrm>
-            <a:off x="398781" y="892517"/>
-            <a:ext cx="3461936" cy="2308324"/>
+            <a:off x="610320" y="2870788"/>
+            <a:ext cx="3461938" cy="1569660"/>
           </a:xfrm>
           <a:prstGeom prst="rect">
             <a:avLst/>
@@ -3428,26 +3427,26 @@
           </a:bodyPr>
           <a:lstStyle/>
           <a:p>
-            <a:r>
-              <a:rPr kumimoji="1" lang="en-US" altLang="zh-CN" sz="2400" b="1" dirty="0" err="1" smtClean="0">
+            <a:pPr marL="342900" indent="-342900">
+              <a:buFont typeface="Arial" charset="0"/>
+              <a:buChar char="•"/>
+            </a:pPr>
+            <a:r>
+              <a:rPr kumimoji="1" lang="en-US" altLang="zh-CN" sz="2400" dirty="0" smtClean="0">
                 <a:latin typeface="Arial" charset="0"/>
                 <a:ea typeface="Arial" charset="0"/>
                 <a:cs typeface="Arial" charset="0"/>
               </a:rPr>
-              <a:t>Hyperparameters</a:t>
-            </a:r>
-            <a:endParaRPr kumimoji="1" lang="en-US" altLang="zh-CN" sz="2400" b="1" dirty="0" smtClean="0">
-              <a:latin typeface="Arial" charset="0"/>
-              <a:ea typeface="Arial" charset="0"/>
-              <a:cs typeface="Arial" charset="0"/>
-            </a:endParaRPr>
-          </a:p>
-          <a:p>
-            <a:endParaRPr kumimoji="1" lang="en-US" altLang="zh-CN" sz="2400" b="1" dirty="0" smtClean="0">
-              <a:latin typeface="Arial" charset="0"/>
-              <a:ea typeface="Arial" charset="0"/>
-              <a:cs typeface="Arial" charset="0"/>
-            </a:endParaRPr>
+              <a:t>Learning </a:t>
+            </a:r>
+            <a:r>
+              <a:rPr kumimoji="1" lang="en-US" altLang="zh-CN" sz="2400" dirty="0" smtClean="0">
+                <a:latin typeface="Arial" charset="0"/>
+                <a:ea typeface="Arial" charset="0"/>
+                <a:cs typeface="Arial" charset="0"/>
+              </a:rPr>
+              <a:t>rate </a:t>
+            </a:r>
           </a:p>
           <a:p>
             <a:pPr marL="342900" indent="-342900">
@@ -3455,21 +3454,7 @@
               <a:buChar char="•"/>
             </a:pPr>
             <a:r>
-              <a:rPr kumimoji="1" lang="en-US" altLang="zh-CN" sz="2400" b="1" dirty="0" smtClean="0">
-                <a:latin typeface="Arial" charset="0"/>
-                <a:ea typeface="Arial" charset="0"/>
-                <a:cs typeface="Arial" charset="0"/>
-              </a:rPr>
-              <a:t>Learning rate </a:t>
-            </a:r>
-          </a:p>
-          <a:p>
-            <a:pPr marL="342900" indent="-342900">
-              <a:buFont typeface="Arial" charset="0"/>
-              <a:buChar char="•"/>
-            </a:pPr>
-            <a:r>
-              <a:rPr kumimoji="1" lang="en-US" altLang="zh-CN" sz="2400" b="1" dirty="0" smtClean="0">
+              <a:rPr kumimoji="1" lang="en-US" altLang="zh-CN" sz="2400" dirty="0" smtClean="0">
                 <a:latin typeface="Arial" charset="0"/>
                 <a:ea typeface="Arial" charset="0"/>
                 <a:cs typeface="Arial" charset="0"/>
@@ -3483,14 +3468,14 @@
               <a:buChar char="•"/>
             </a:pPr>
             <a:r>
-              <a:rPr kumimoji="1" lang="en-US" altLang="zh-CN" sz="2400" b="1" dirty="0" smtClean="0">
+              <a:rPr kumimoji="1" lang="en-US" altLang="zh-CN" sz="2400" dirty="0" smtClean="0">
                 <a:latin typeface="Arial" charset="0"/>
                 <a:ea typeface="Arial" charset="0"/>
                 <a:cs typeface="Arial" charset="0"/>
               </a:rPr>
               <a:t>Number of epochs</a:t>
             </a:r>
-            <a:endParaRPr kumimoji="1" lang="en-US" altLang="zh-CN" sz="2400" b="1" dirty="0">
+            <a:endParaRPr kumimoji="1" lang="en-US" altLang="zh-CN" sz="2400" dirty="0">
               <a:latin typeface="Arial" charset="0"/>
               <a:ea typeface="Arial" charset="0"/>
               <a:cs typeface="Arial" charset="0"/>
@@ -3502,7 +3487,7 @@
               <a:buChar char="•"/>
             </a:pPr>
             <a:r>
-              <a:rPr kumimoji="1" lang="en-US" altLang="zh-CN" sz="2400" b="1" dirty="0" smtClean="0">
+              <a:rPr kumimoji="1" lang="en-US" altLang="zh-CN" sz="2400" dirty="0" smtClean="0">
                 <a:latin typeface="Arial" charset="0"/>
                 <a:ea typeface="Arial" charset="0"/>
                 <a:cs typeface="Arial" charset="0"/>
@@ -3510,14 +3495,14 @@
               <a:t>Sampling ratio</a:t>
             </a:r>
             <a:r>
-              <a:rPr kumimoji="1" lang="zh-CN" altLang="en-US" sz="2400" b="1" dirty="0" smtClean="0">
+              <a:rPr kumimoji="1" lang="zh-CN" altLang="en-US" sz="2400" dirty="0" smtClean="0">
                 <a:latin typeface="Arial" charset="0"/>
                 <a:ea typeface="Arial" charset="0"/>
                 <a:cs typeface="Arial" charset="0"/>
               </a:rPr>
               <a:t>  </a:t>
             </a:r>
-            <a:endParaRPr kumimoji="1" lang="zh-CN" altLang="en-US" sz="1600" b="1" dirty="0">
+            <a:endParaRPr kumimoji="1" lang="zh-CN" altLang="en-US" sz="1600" dirty="0">
               <a:latin typeface="Arial" charset="0"/>
               <a:ea typeface="Arial" charset="0"/>
               <a:cs typeface="Arial" charset="0"/>
@@ -3533,8 +3518,8 @@
         </p:nvSpPr>
         <p:spPr>
           <a:xfrm>
-            <a:off x="8999655" y="890333"/>
-            <a:ext cx="2556041" cy="461665"/>
+            <a:off x="8917200" y="3030455"/>
+            <a:ext cx="2556041" cy="830997"/>
           </a:xfrm>
           <a:prstGeom prst="rect">
             <a:avLst/>
@@ -3547,8 +3532,9 @@
           </a:bodyPr>
           <a:lstStyle/>
           <a:p>
-            <a:r>
-              <a:rPr kumimoji="1" lang="en-US" altLang="zh-CN" sz="2400" b="1" dirty="0">
+            <a:pPr algn="ctr"/>
+            <a:r>
+              <a:rPr kumimoji="1" lang="en-US" altLang="zh-CN" sz="2400" dirty="0">
                 <a:latin typeface="Arial" charset="0"/>
                 <a:ea typeface="Arial" charset="0"/>
                 <a:cs typeface="Arial" charset="0"/>
@@ -3556,7 +3542,7 @@
               <a:t>T</a:t>
             </a:r>
             <a:r>
-              <a:rPr kumimoji="1" lang="en-US" altLang="zh-CN" sz="2400" b="1" dirty="0" smtClean="0">
+              <a:rPr kumimoji="1" lang="en-US" altLang="zh-CN" sz="2400" dirty="0" smtClean="0">
                 <a:latin typeface="Arial" charset="0"/>
                 <a:ea typeface="Arial" charset="0"/>
                 <a:cs typeface="Arial" charset="0"/>
@@ -3564,22 +3550,30 @@
               <a:t>est</a:t>
             </a:r>
             <a:r>
-              <a:rPr kumimoji="1" lang="zh-CN" altLang="en-US" sz="2400" b="1" dirty="0" smtClean="0">
+              <a:rPr kumimoji="1" lang="zh-CN" altLang="en-US" sz="2400" dirty="0" smtClean="0">
                 <a:latin typeface="Arial" charset="0"/>
                 <a:ea typeface="Arial" charset="0"/>
                 <a:cs typeface="Arial" charset="0"/>
               </a:rPr>
               <a:t> </a:t>
             </a:r>
-            <a:r>
-              <a:rPr kumimoji="1" lang="en-US" altLang="zh-CN" sz="2400" b="1" dirty="0" smtClean="0">
+            <a:endParaRPr kumimoji="1" lang="en-US" altLang="zh-CN" sz="2400" dirty="0" smtClean="0">
+              <a:latin typeface="Arial" charset="0"/>
+              <a:ea typeface="Arial" charset="0"/>
+              <a:cs typeface="Arial" charset="0"/>
+            </a:endParaRPr>
+          </a:p>
+          <a:p>
+            <a:pPr algn="ctr"/>
+            <a:r>
+              <a:rPr kumimoji="1" lang="en-US" altLang="zh-CN" sz="2400" dirty="0" smtClean="0">
                 <a:latin typeface="Arial" charset="0"/>
                 <a:ea typeface="Arial" charset="0"/>
                 <a:cs typeface="Arial" charset="0"/>
               </a:rPr>
               <a:t>accuracy</a:t>
             </a:r>
-            <a:endParaRPr kumimoji="1" lang="en-US" altLang="zh-CN" sz="2400" b="1" dirty="0">
+            <a:endParaRPr kumimoji="1" lang="en-US" altLang="zh-CN" sz="2400" dirty="0">
               <a:latin typeface="Arial" charset="0"/>
               <a:ea typeface="Arial" charset="0"/>
               <a:cs typeface="Arial" charset="0"/>
@@ -3595,7 +3589,7 @@
         </p:nvGrpSpPr>
         <p:grpSpPr>
           <a:xfrm>
-            <a:off x="1845679" y="4941222"/>
+            <a:off x="1360658" y="6996424"/>
             <a:ext cx="8566322" cy="1407820"/>
             <a:chOff x="1340767" y="4751417"/>
             <a:chExt cx="9996100" cy="1641608"/>
@@ -3753,8 +3747,8 @@
         </p:nvSpPr>
         <p:spPr>
           <a:xfrm flipV="1">
-            <a:off x="1557457" y="3246589"/>
-            <a:ext cx="1555371" cy="1358377"/>
+            <a:off x="1275382" y="4895864"/>
+            <a:ext cx="1065907" cy="1164968"/>
           </a:xfrm>
           <a:prstGeom prst="bentArrow">
             <a:avLst/>
@@ -3789,14 +3783,61 @@
       </p:sp>
       <p:sp>
         <p:nvSpPr>
-          <p:cNvPr id="33" name="Rechteckiger Pfeil 32"/>
+          <p:cNvPr id="15" name="Rechteckiger Pfeil 14"/>
           <p:cNvSpPr/>
           <p:nvPr/>
         </p:nvSpPr>
         <p:spPr>
+          <a:xfrm rot="16200000" flipH="1">
+            <a:off x="1179516" y="1069397"/>
+            <a:ext cx="1176991" cy="985259"/>
+          </a:xfrm>
+          <a:prstGeom prst="bentArrow">
+            <a:avLst>
+              <a:gd name="adj1" fmla="val 25000"/>
+              <a:gd name="adj2" fmla="val 24185"/>
+              <a:gd name="adj3" fmla="val 25000"/>
+              <a:gd name="adj4" fmla="val 43750"/>
+            </a:avLst>
+          </a:prstGeom>
+        </p:spPr>
+        <p:style>
+          <a:lnRef idx="2">
+            <a:schemeClr val="accent6"/>
+          </a:lnRef>
+          <a:fillRef idx="1">
+            <a:schemeClr val="lt1"/>
+          </a:fillRef>
+          <a:effectRef idx="0">
+            <a:schemeClr val="accent6"/>
+          </a:effectRef>
+          <a:fontRef idx="minor">
+            <a:schemeClr val="dk1"/>
+          </a:fontRef>
+        </p:style>
+        <p:txBody>
+          <a:bodyPr rtlCol="0" anchor="ctr"/>
+          <a:lstStyle/>
+          <a:p>
+            <a:pPr algn="ctr"/>
+            <a:endParaRPr lang="de-DE">
+              <a:solidFill>
+                <a:schemeClr val="tx1"/>
+              </a:solidFill>
+            </a:endParaRPr>
+          </a:p>
+        </p:txBody>
+      </p:sp>
+      <p:sp>
+        <p:nvSpPr>
+          <p:cNvPr id="16" name="Rechteckiger Pfeil 15"/>
+          <p:cNvSpPr/>
+          <p:nvPr/>
+        </p:nvSpPr>
+        <p:spPr>
           <a:xfrm rot="16200000" flipV="1">
-            <a:off x="9499989" y="3148092"/>
-            <a:ext cx="1555371" cy="1358377"/>
+            <a:off x="9976508" y="4895863"/>
+            <a:ext cx="1065907" cy="1164968"/>
           </a:xfrm>
           <a:prstGeom prst="bentArrow">
             <a:avLst/>
@@ -3829,19 +3870,53 @@
           </a:p>
         </p:txBody>
       </p:sp>
-      <p:sp>
-        <p:nvSpPr>
-          <p:cNvPr id="18" name="Pfeil nach rechts 17"/>
+      <p:pic>
+        <p:nvPicPr>
+          <p:cNvPr id="2" name="Bild 1"/>
+          <p:cNvPicPr>
+            <a:picLocks noChangeAspect="1"/>
+          </p:cNvPicPr>
+          <p:nvPr/>
+        </p:nvPicPr>
+        <p:blipFill rotWithShape="1">
+          <a:blip r:embed="rId5">
+            <a:extLst>
+              <a:ext uri="{28A0092B-C50C-407E-A947-70E740481C1C}">
+                <a14:useLocalDpi xmlns:a14="http://schemas.microsoft.com/office/drawing/2010/main" val="0"/>
+              </a:ext>
+            </a:extLst>
+          </a:blip>
+          <a:srcRect t="1247" b="13694"/>
+          <a:stretch/>
+        </p:blipFill>
+        <p:spPr>
+          <a:xfrm>
+            <a:off x="2412328" y="5193657"/>
+            <a:ext cx="7443611" cy="1049557"/>
+          </a:xfrm>
+          <a:prstGeom prst="rect">
+            <a:avLst/>
+          </a:prstGeom>
+        </p:spPr>
+      </p:pic>
+      <p:sp>
+        <p:nvSpPr>
+          <p:cNvPr id="19" name="Rechteckiger Pfeil 18"/>
           <p:cNvSpPr/>
           <p:nvPr/>
         </p:nvSpPr>
         <p:spPr>
           <a:xfrm flipH="1">
-            <a:off x="7874146" y="896913"/>
-            <a:ext cx="733451" cy="544366"/>
+            <a:off x="9792658" y="885388"/>
+            <a:ext cx="1176991" cy="985259"/>
           </a:xfrm>
-          <a:prstGeom prst="rightArrow">
-            <a:avLst/>
+          <a:prstGeom prst="bentArrow">
+            <a:avLst>
+              <a:gd name="adj1" fmla="val 25000"/>
+              <a:gd name="adj2" fmla="val 24185"/>
+              <a:gd name="adj3" fmla="val 25000"/>
+              <a:gd name="adj4" fmla="val 43750"/>
+            </a:avLst>
           </a:prstGeom>
         </p:spPr>
         <p:style>
@@ -3863,45 +3938,11 @@
           <a:lstStyle/>
           <a:p>
             <a:pPr algn="ctr"/>
-            <a:endParaRPr lang="de-DE"/>
-          </a:p>
-        </p:txBody>
-      </p:sp>
-      <p:sp>
-        <p:nvSpPr>
-          <p:cNvPr id="36" name="Pfeil nach rechts 35"/>
-          <p:cNvSpPr/>
-          <p:nvPr/>
-        </p:nvSpPr>
-        <p:spPr>
-          <a:xfrm flipH="1">
-            <a:off x="3134885" y="890333"/>
-            <a:ext cx="808840" cy="544366"/>
-          </a:xfrm>
-          <a:prstGeom prst="rightArrow">
-            <a:avLst/>
-          </a:prstGeom>
-        </p:spPr>
-        <p:style>
-          <a:lnRef idx="2">
-            <a:schemeClr val="accent6"/>
-          </a:lnRef>
-          <a:fillRef idx="1">
-            <a:schemeClr val="lt1"/>
-          </a:fillRef>
-          <a:effectRef idx="0">
-            <a:schemeClr val="accent6"/>
-          </a:effectRef>
-          <a:fontRef idx="minor">
-            <a:schemeClr val="dk1"/>
-          </a:fontRef>
-        </p:style>
-        <p:txBody>
-          <a:bodyPr rtlCol="0" anchor="ctr"/>
-          <a:lstStyle/>
-          <a:p>
-            <a:pPr algn="ctr"/>
-            <a:endParaRPr lang="de-DE"/>
+            <a:endParaRPr lang="de-DE">
+              <a:solidFill>
+                <a:schemeClr val="tx1"/>
+              </a:solidFill>
+            </a:endParaRPr>
           </a:p>
         </p:txBody>
       </p:sp>

</xml_diff>